<commit_message>
@UCSB-SEAL digital_logic: alu_0, adder_0 and adder_tree_0 added
Signed-off-by: SaltedFishLZ <liangzheng@pku.edu.cn>
</commit_message>
<xml_diff>
--- a/hardware/digital_circuits/gates/gate_and/gate_and_0_draft.pptx
+++ b/hardware/digital_circuits/gates/gate_and/gate_and_0_draft.pptx
@@ -116,7 +116,7 @@
   <p:extLst>
     <p:ext uri="{EFAFB233-063F-42B5-8137-9DF3F51BA10A}">
       <p15:sldGuideLst xmlns:p15="http://schemas.microsoft.com/office/powerpoint/2012/main">
-        <p15:guide id="1" orient="horz" pos="2016" userDrawn="1">
+        <p15:guide id="1" orient="horz" pos="2040" userDrawn="1">
           <p15:clr>
             <a:srgbClr val="A4A3A4"/>
           </p15:clr>
@@ -214,7 +214,7 @@
           <a:p>
             <a:fld id="{B0976431-D0D8-4306-AB6B-0DA9E96FC317}" type="datetimeFigureOut">
               <a:rPr lang="zh-CN" altLang="en-US" smtClean="0"/>
-              <a:t>2019/1/20</a:t>
+              <a:t>2019/1/24</a:t>
             </a:fld>
             <a:endParaRPr lang="zh-CN" altLang="en-US"/>
           </a:p>
@@ -1159,7 +1159,7 @@
           <a:p>
             <a:fld id="{76D35F51-43C1-4B70-B534-C372FD2C93C0}" type="datetimeFigureOut">
               <a:rPr lang="zh-CN" altLang="en-US" smtClean="0"/>
-              <a:t>2019/1/20</a:t>
+              <a:t>2019/1/24</a:t>
             </a:fld>
             <a:endParaRPr lang="zh-CN" altLang="en-US"/>
           </a:p>
@@ -1329,7 +1329,7 @@
           <a:p>
             <a:fld id="{76D35F51-43C1-4B70-B534-C372FD2C93C0}" type="datetimeFigureOut">
               <a:rPr lang="zh-CN" altLang="en-US" smtClean="0"/>
-              <a:t>2019/1/20</a:t>
+              <a:t>2019/1/24</a:t>
             </a:fld>
             <a:endParaRPr lang="zh-CN" altLang="en-US"/>
           </a:p>
@@ -1509,7 +1509,7 @@
           <a:p>
             <a:fld id="{76D35F51-43C1-4B70-B534-C372FD2C93C0}" type="datetimeFigureOut">
               <a:rPr lang="zh-CN" altLang="en-US" smtClean="0"/>
-              <a:t>2019/1/20</a:t>
+              <a:t>2019/1/24</a:t>
             </a:fld>
             <a:endParaRPr lang="zh-CN" altLang="en-US"/>
           </a:p>
@@ -1679,7 +1679,7 @@
           <a:p>
             <a:fld id="{76D35F51-43C1-4B70-B534-C372FD2C93C0}" type="datetimeFigureOut">
               <a:rPr lang="zh-CN" altLang="en-US" smtClean="0"/>
-              <a:t>2019/1/20</a:t>
+              <a:t>2019/1/24</a:t>
             </a:fld>
             <a:endParaRPr lang="zh-CN" altLang="en-US"/>
           </a:p>
@@ -1925,7 +1925,7 @@
           <a:p>
             <a:fld id="{76D35F51-43C1-4B70-B534-C372FD2C93C0}" type="datetimeFigureOut">
               <a:rPr lang="zh-CN" altLang="en-US" smtClean="0"/>
-              <a:t>2019/1/20</a:t>
+              <a:t>2019/1/24</a:t>
             </a:fld>
             <a:endParaRPr lang="zh-CN" altLang="en-US"/>
           </a:p>
@@ -2157,7 +2157,7 @@
           <a:p>
             <a:fld id="{76D35F51-43C1-4B70-B534-C372FD2C93C0}" type="datetimeFigureOut">
               <a:rPr lang="zh-CN" altLang="en-US" smtClean="0"/>
-              <a:t>2019/1/20</a:t>
+              <a:t>2019/1/24</a:t>
             </a:fld>
             <a:endParaRPr lang="zh-CN" altLang="en-US"/>
           </a:p>
@@ -2524,7 +2524,7 @@
           <a:p>
             <a:fld id="{76D35F51-43C1-4B70-B534-C372FD2C93C0}" type="datetimeFigureOut">
               <a:rPr lang="zh-CN" altLang="en-US" smtClean="0"/>
-              <a:t>2019/1/20</a:t>
+              <a:t>2019/1/24</a:t>
             </a:fld>
             <a:endParaRPr lang="zh-CN" altLang="en-US"/>
           </a:p>
@@ -2642,7 +2642,7 @@
           <a:p>
             <a:fld id="{76D35F51-43C1-4B70-B534-C372FD2C93C0}" type="datetimeFigureOut">
               <a:rPr lang="zh-CN" altLang="en-US" smtClean="0"/>
-              <a:t>2019/1/20</a:t>
+              <a:t>2019/1/24</a:t>
             </a:fld>
             <a:endParaRPr lang="zh-CN" altLang="en-US"/>
           </a:p>
@@ -2737,7 +2737,7 @@
           <a:p>
             <a:fld id="{76D35F51-43C1-4B70-B534-C372FD2C93C0}" type="datetimeFigureOut">
               <a:rPr lang="zh-CN" altLang="en-US" smtClean="0"/>
-              <a:t>2019/1/20</a:t>
+              <a:t>2019/1/24</a:t>
             </a:fld>
             <a:endParaRPr lang="zh-CN" altLang="en-US"/>
           </a:p>
@@ -3014,7 +3014,7 @@
           <a:p>
             <a:fld id="{76D35F51-43C1-4B70-B534-C372FD2C93C0}" type="datetimeFigureOut">
               <a:rPr lang="zh-CN" altLang="en-US" smtClean="0"/>
-              <a:t>2019/1/20</a:t>
+              <a:t>2019/1/24</a:t>
             </a:fld>
             <a:endParaRPr lang="zh-CN" altLang="en-US"/>
           </a:p>
@@ -3267,7 +3267,7 @@
           <a:p>
             <a:fld id="{76D35F51-43C1-4B70-B534-C372FD2C93C0}" type="datetimeFigureOut">
               <a:rPr lang="zh-CN" altLang="en-US" smtClean="0"/>
-              <a:t>2019/1/20</a:t>
+              <a:t>2019/1/24</a:t>
             </a:fld>
             <a:endParaRPr lang="zh-CN" altLang="en-US"/>
           </a:p>
@@ -3480,7 +3480,7 @@
           <a:p>
             <a:fld id="{76D35F51-43C1-4B70-B534-C372FD2C93C0}" type="datetimeFigureOut">
               <a:rPr lang="zh-CN" altLang="en-US" smtClean="0"/>
-              <a:t>2019/1/20</a:t>
+              <a:t>2019/1/24</a:t>
             </a:fld>
             <a:endParaRPr lang="zh-CN" altLang="en-US"/>
           </a:p>

</xml_diff>